<commit_message>
garbage collection 2 slides
</commit_message>
<xml_diff>
--- a/ClassMaterials/GarbageCollection1/GarbageCollection.pptx
+++ b/ClassMaterials/GarbageCollection1/GarbageCollection.pptx
@@ -11,9 +11,7 @@
     <p:sldId id="259" r:id="rId5"/>
     <p:sldId id="260" r:id="rId6"/>
     <p:sldId id="264" r:id="rId7"/>
-    <p:sldId id="261" r:id="rId8"/>
-    <p:sldId id="262" r:id="rId9"/>
-    <p:sldId id="263" r:id="rId10"/>
+    <p:sldId id="265" r:id="rId8"/>
   </p:sldIdLst>
   <p:sldSz cx="12192000" cy="6858000"/>
   <p:notesSz cx="6858000" cy="9144000"/>
@@ -267,7 +265,7 @@
           <a:p>
             <a:fld id="{4C14442F-1F4F-484B-A48C-24DE1B6741FF}" type="datetimeFigureOut">
               <a:rPr lang="en-US" smtClean="0"/>
-              <a:t>10/30/2023</a:t>
+              <a:t>11/4/2024</a:t>
             </a:fld>
             <a:endParaRPr lang="en-US"/>
           </a:p>
@@ -465,7 +463,7 @@
           <a:p>
             <a:fld id="{4C14442F-1F4F-484B-A48C-24DE1B6741FF}" type="datetimeFigureOut">
               <a:rPr lang="en-US" smtClean="0"/>
-              <a:t>10/30/2023</a:t>
+              <a:t>11/4/2024</a:t>
             </a:fld>
             <a:endParaRPr lang="en-US"/>
           </a:p>
@@ -673,7 +671,7 @@
           <a:p>
             <a:fld id="{4C14442F-1F4F-484B-A48C-24DE1B6741FF}" type="datetimeFigureOut">
               <a:rPr lang="en-US" smtClean="0"/>
-              <a:t>10/30/2023</a:t>
+              <a:t>11/4/2024</a:t>
             </a:fld>
             <a:endParaRPr lang="en-US"/>
           </a:p>
@@ -871,7 +869,7 @@
           <a:p>
             <a:fld id="{4C14442F-1F4F-484B-A48C-24DE1B6741FF}" type="datetimeFigureOut">
               <a:rPr lang="en-US" smtClean="0"/>
-              <a:t>10/30/2023</a:t>
+              <a:t>11/4/2024</a:t>
             </a:fld>
             <a:endParaRPr lang="en-US"/>
           </a:p>
@@ -1146,7 +1144,7 @@
           <a:p>
             <a:fld id="{4C14442F-1F4F-484B-A48C-24DE1B6741FF}" type="datetimeFigureOut">
               <a:rPr lang="en-US" smtClean="0"/>
-              <a:t>10/30/2023</a:t>
+              <a:t>11/4/2024</a:t>
             </a:fld>
             <a:endParaRPr lang="en-US"/>
           </a:p>
@@ -1411,7 +1409,7 @@
           <a:p>
             <a:fld id="{4C14442F-1F4F-484B-A48C-24DE1B6741FF}" type="datetimeFigureOut">
               <a:rPr lang="en-US" smtClean="0"/>
-              <a:t>10/30/2023</a:t>
+              <a:t>11/4/2024</a:t>
             </a:fld>
             <a:endParaRPr lang="en-US"/>
           </a:p>
@@ -1823,7 +1821,7 @@
           <a:p>
             <a:fld id="{4C14442F-1F4F-484B-A48C-24DE1B6741FF}" type="datetimeFigureOut">
               <a:rPr lang="en-US" smtClean="0"/>
-              <a:t>10/30/2023</a:t>
+              <a:t>11/4/2024</a:t>
             </a:fld>
             <a:endParaRPr lang="en-US"/>
           </a:p>
@@ -1964,7 +1962,7 @@
           <a:p>
             <a:fld id="{4C14442F-1F4F-484B-A48C-24DE1B6741FF}" type="datetimeFigureOut">
               <a:rPr lang="en-US" smtClean="0"/>
-              <a:t>10/30/2023</a:t>
+              <a:t>11/4/2024</a:t>
             </a:fld>
             <a:endParaRPr lang="en-US"/>
           </a:p>
@@ -2077,7 +2075,7 @@
           <a:p>
             <a:fld id="{4C14442F-1F4F-484B-A48C-24DE1B6741FF}" type="datetimeFigureOut">
               <a:rPr lang="en-US" smtClean="0"/>
-              <a:t>10/30/2023</a:t>
+              <a:t>11/4/2024</a:t>
             </a:fld>
             <a:endParaRPr lang="en-US"/>
           </a:p>
@@ -2388,7 +2386,7 @@
           <a:p>
             <a:fld id="{4C14442F-1F4F-484B-A48C-24DE1B6741FF}" type="datetimeFigureOut">
               <a:rPr lang="en-US" smtClean="0"/>
-              <a:t>10/30/2023</a:t>
+              <a:t>11/4/2024</a:t>
             </a:fld>
             <a:endParaRPr lang="en-US"/>
           </a:p>
@@ -2676,7 +2674,7 @@
           <a:p>
             <a:fld id="{4C14442F-1F4F-484B-A48C-24DE1B6741FF}" type="datetimeFigureOut">
               <a:rPr lang="en-US" smtClean="0"/>
-              <a:t>10/30/2023</a:t>
+              <a:t>11/4/2024</a:t>
             </a:fld>
             <a:endParaRPr lang="en-US"/>
           </a:p>
@@ -2917,7 +2915,7 @@
           <a:p>
             <a:fld id="{4C14442F-1F4F-484B-A48C-24DE1B6741FF}" type="datetimeFigureOut">
               <a:rPr lang="en-US" smtClean="0"/>
-              <a:t>10/30/2023</a:t>
+              <a:t>11/4/2024</a:t>
             </a:fld>
             <a:endParaRPr lang="en-US"/>
           </a:p>
@@ -3320,6 +3318,14 @@
 <file path=ppt/slides/slide1.xml><?xml version="1.0" encoding="utf-8"?>
 <p:sld xmlns:a="http://schemas.openxmlformats.org/drawingml/2006/main" xmlns:r="http://schemas.openxmlformats.org/officeDocument/2006/relationships" xmlns:p="http://schemas.openxmlformats.org/presentationml/2006/main">
   <p:cSld>
+    <p:bg>
+      <p:bgPr>
+        <a:solidFill>
+          <a:schemeClr val="bg1"/>
+        </a:solidFill>
+        <a:effectLst/>
+      </p:bgPr>
+    </p:bg>
     <p:spTree>
       <p:nvGrpSpPr>
         <p:cNvPr id="1" name=""/>
@@ -3334,6 +3340,66 @@
           <a:chExt cx="0" cy="0"/>
         </a:xfrm>
       </p:grpSpPr>
+      <p:sp useBgFill="1">
+        <p:nvSpPr>
+          <p:cNvPr id="14" name="Rectangle 13">
+            <a:extLst>
+              <a:ext uri="{FF2B5EF4-FFF2-40B4-BE49-F238E27FC236}">
+                <a16:creationId xmlns:a16="http://schemas.microsoft.com/office/drawing/2014/main" id="{06DA9DF9-31F7-4056-B42E-878CC92417B8}"/>
+              </a:ext>
+              <a:ext uri="{C183D7F6-B498-43B3-948B-1728B52AA6E4}">
+                <adec:decorative xmlns:adec="http://schemas.microsoft.com/office/drawing/2017/decorative" val="1"/>
+              </a:ext>
+            </a:extLst>
+          </p:cNvPr>
+          <p:cNvSpPr>
+            <a:spLocks noGrp="1" noRot="1" noChangeAspect="1" noMove="1" noResize="1" noEditPoints="1" noAdjustHandles="1" noChangeArrowheads="1" noChangeShapeType="1" noTextEdit="1"/>
+          </p:cNvSpPr>
+          <p:nvPr>
+            <p:extLst>
+              <p:ext uri="{386F3935-93C4-4BCD-93E2-E3B085C9AB24}">
+                <p16:designElem xmlns:p16="http://schemas.microsoft.com/office/powerpoint/2015/main" val="1"/>
+              </p:ext>
+            </p:extLst>
+          </p:nvPr>
+        </p:nvSpPr>
+        <p:spPr>
+          <a:xfrm>
+            <a:off x="0" y="0"/>
+            <a:ext cx="12188952" cy="6858000"/>
+          </a:xfrm>
+          <a:prstGeom prst="rect">
+            <a:avLst/>
+          </a:prstGeom>
+          <a:ln>
+            <a:noFill/>
+          </a:ln>
+        </p:spPr>
+        <p:style>
+          <a:lnRef idx="2">
+            <a:schemeClr val="accent1">
+              <a:shade val="50000"/>
+            </a:schemeClr>
+          </a:lnRef>
+          <a:fillRef idx="1">
+            <a:schemeClr val="accent1"/>
+          </a:fillRef>
+          <a:effectRef idx="0">
+            <a:schemeClr val="accent1"/>
+          </a:effectRef>
+          <a:fontRef idx="minor">
+            <a:schemeClr val="lt1"/>
+          </a:fontRef>
+        </p:style>
+        <p:txBody>
+          <a:bodyPr rtlCol="0" anchor="ctr"/>
+          <a:lstStyle/>
+          <a:p>
+            <a:pPr algn="ctr"/>
+            <a:endParaRPr lang="en-US"/>
+          </a:p>
+        </p:txBody>
+      </p:sp>
       <p:sp>
         <p:nvSpPr>
           <p:cNvPr id="2" name="Title 1">
@@ -3350,13 +3416,21 @@
             <p:ph type="ctrTitle"/>
           </p:nvPr>
         </p:nvSpPr>
-        <p:spPr/>
-        <p:txBody>
-          <a:bodyPr/>
-          <a:lstStyle/>
-          <a:p>
-            <a:r>
-              <a:rPr lang="en-US" dirty="0"/>
+        <p:spPr>
+          <a:xfrm>
+            <a:off x="643468" y="643467"/>
+            <a:ext cx="4620584" cy="4567137"/>
+          </a:xfrm>
+        </p:spPr>
+        <p:txBody>
+          <a:bodyPr>
+            <a:normAutofit/>
+          </a:bodyPr>
+          <a:lstStyle/>
+          <a:p>
+            <a:pPr algn="l"/>
+            <a:r>
+              <a:rPr lang="en-US" sz="4400"/>
               <a:t>Garbage Collection</a:t>
             </a:r>
           </a:p>
@@ -3378,15 +3452,516 @@
             <p:ph type="subTitle" idx="1"/>
           </p:nvPr>
         </p:nvSpPr>
-        <p:spPr/>
-        <p:txBody>
-          <a:bodyPr/>
-          <a:lstStyle/>
-          <a:p>
+        <p:spPr>
+          <a:xfrm>
+            <a:off x="643467" y="5277684"/>
+            <a:ext cx="4620584" cy="775494"/>
+          </a:xfrm>
+        </p:spPr>
+        <p:txBody>
+          <a:bodyPr>
+            <a:normAutofit/>
+          </a:bodyPr>
+          <a:lstStyle/>
+          <a:p>
+            <a:pPr algn="l"/>
             <a:endParaRPr lang="en-US"/>
           </a:p>
         </p:txBody>
       </p:sp>
+      <p:pic>
+        <p:nvPicPr>
+          <p:cNvPr id="5" name="Picture 4" descr="A black and white graphic of a sun&#10;&#10;Description automatically generated">
+            <a:extLst>
+              <a:ext uri="{FF2B5EF4-FFF2-40B4-BE49-F238E27FC236}">
+                <a16:creationId xmlns:a16="http://schemas.microsoft.com/office/drawing/2014/main" id="{4EC7D6AC-91F8-5FD8-6020-53858CF9B0BF}"/>
+              </a:ext>
+            </a:extLst>
+          </p:cNvPr>
+          <p:cNvPicPr>
+            <a:picLocks noChangeAspect="1"/>
+          </p:cNvPicPr>
+          <p:nvPr/>
+        </p:nvPicPr>
+        <p:blipFill>
+          <a:blip r:embed="rId2"/>
+          <a:srcRect l="6728" r="6326"/>
+          <a:stretch/>
+        </p:blipFill>
+        <p:spPr>
+          <a:xfrm>
+            <a:off x="6229215" y="10"/>
+            <a:ext cx="5962785" cy="6857990"/>
+          </a:xfrm>
+          <a:custGeom>
+            <a:avLst/>
+            <a:gdLst/>
+            <a:ahLst/>
+            <a:cxnLst/>
+            <a:rect l="l" t="t" r="r" b="b"/>
+            <a:pathLst>
+              <a:path w="5962785" h="6858000">
+                <a:moveTo>
+                  <a:pt x="1044839" y="0"/>
+                </a:moveTo>
+                <a:lnTo>
+                  <a:pt x="5962785" y="0"/>
+                </a:lnTo>
+                <a:lnTo>
+                  <a:pt x="5962785" y="6858000"/>
+                </a:lnTo>
+                <a:lnTo>
+                  <a:pt x="1469886" y="6858000"/>
+                </a:lnTo>
+                <a:lnTo>
+                  <a:pt x="1416006" y="6823984"/>
+                </a:lnTo>
+                <a:cubicBezTo>
+                  <a:pt x="1356767" y="6787940"/>
+                  <a:pt x="1296437" y="6755500"/>
+                  <a:pt x="1232473" y="6733873"/>
+                </a:cubicBezTo>
+                <a:cubicBezTo>
+                  <a:pt x="1145250" y="6705037"/>
+                  <a:pt x="1060933" y="6654575"/>
+                  <a:pt x="1075471" y="6503186"/>
+                </a:cubicBezTo>
+                <a:cubicBezTo>
+                  <a:pt x="1078378" y="6459932"/>
+                  <a:pt x="1055118" y="6427493"/>
+                  <a:pt x="1020229" y="6438306"/>
+                </a:cubicBezTo>
+                <a:cubicBezTo>
+                  <a:pt x="953358" y="6459932"/>
+                  <a:pt x="921375" y="6398656"/>
+                  <a:pt x="883579" y="6351798"/>
+                </a:cubicBezTo>
+                <a:cubicBezTo>
+                  <a:pt x="816707" y="6268895"/>
+                  <a:pt x="752743" y="6182387"/>
+                  <a:pt x="645167" y="6167969"/>
+                </a:cubicBezTo>
+                <a:cubicBezTo>
+                  <a:pt x="665519" y="6103088"/>
+                  <a:pt x="700408" y="6110298"/>
+                  <a:pt x="732391" y="6124716"/>
+                </a:cubicBezTo>
+                <a:cubicBezTo>
+                  <a:pt x="816707" y="6160761"/>
+                  <a:pt x="901023" y="6200410"/>
+                  <a:pt x="985339" y="6236455"/>
+                </a:cubicBezTo>
+                <a:cubicBezTo>
+                  <a:pt x="1040581" y="6258081"/>
+                  <a:pt x="1095822" y="6290522"/>
+                  <a:pt x="1168509" y="6265291"/>
+                </a:cubicBezTo>
+                <a:cubicBezTo>
+                  <a:pt x="1104545" y="6135530"/>
+                  <a:pt x="996969" y="6110298"/>
+                  <a:pt x="909746" y="6070649"/>
+                </a:cubicBezTo>
+                <a:cubicBezTo>
+                  <a:pt x="802169" y="6020185"/>
+                  <a:pt x="738206" y="5926470"/>
+                  <a:pt x="659704" y="5818335"/>
+                </a:cubicBezTo>
+                <a:cubicBezTo>
+                  <a:pt x="738206" y="5789500"/>
+                  <a:pt x="787632" y="5868798"/>
+                  <a:pt x="851597" y="5865193"/>
+                </a:cubicBezTo>
+                <a:cubicBezTo>
+                  <a:pt x="854504" y="5854380"/>
+                  <a:pt x="860319" y="5832753"/>
+                  <a:pt x="860319" y="5832753"/>
+                </a:cubicBezTo>
+                <a:cubicBezTo>
+                  <a:pt x="755650" y="5775081"/>
+                  <a:pt x="709132" y="5666947"/>
+                  <a:pt x="691686" y="5533581"/>
+                </a:cubicBezTo>
+                <a:cubicBezTo>
+                  <a:pt x="685872" y="5465095"/>
+                  <a:pt x="648075" y="5443468"/>
+                  <a:pt x="610278" y="5411029"/>
+                </a:cubicBezTo>
+                <a:cubicBezTo>
+                  <a:pt x="482350" y="5299289"/>
+                  <a:pt x="345700" y="5198364"/>
+                  <a:pt x="238123" y="5046976"/>
+                </a:cubicBezTo>
+                <a:cubicBezTo>
+                  <a:pt x="363144" y="5064998"/>
+                  <a:pt x="461997" y="5165924"/>
+                  <a:pt x="592833" y="5209177"/>
+                </a:cubicBezTo>
+                <a:cubicBezTo>
+                  <a:pt x="488165" y="5043371"/>
+                  <a:pt x="351514" y="4956864"/>
+                  <a:pt x="226494" y="4855939"/>
+                </a:cubicBezTo>
+                <a:cubicBezTo>
+                  <a:pt x="168344" y="4809081"/>
+                  <a:pt x="116011" y="4751408"/>
+                  <a:pt x="49139" y="4726177"/>
+                </a:cubicBezTo>
+                <a:cubicBezTo>
+                  <a:pt x="25879" y="4718968"/>
+                  <a:pt x="-14825" y="4700947"/>
+                  <a:pt x="5527" y="4650483"/>
+                </a:cubicBezTo>
+                <a:cubicBezTo>
+                  <a:pt x="22972" y="4607230"/>
+                  <a:pt x="54954" y="4621648"/>
+                  <a:pt x="84029" y="4632460"/>
+                </a:cubicBezTo>
+                <a:cubicBezTo>
+                  <a:pt x="153807" y="4661296"/>
+                  <a:pt x="229401" y="4661296"/>
+                  <a:pt x="325347" y="4661296"/>
+                </a:cubicBezTo>
+                <a:cubicBezTo>
+                  <a:pt x="243939" y="4524326"/>
+                  <a:pt x="95658" y="4567580"/>
+                  <a:pt x="25879" y="4423401"/>
+                </a:cubicBezTo>
+                <a:cubicBezTo>
+                  <a:pt x="113103" y="4398170"/>
+                  <a:pt x="179975" y="4448632"/>
+                  <a:pt x="249753" y="4459446"/>
+                </a:cubicBezTo>
+                <a:cubicBezTo>
+                  <a:pt x="313718" y="4470259"/>
+                  <a:pt x="328254" y="4445028"/>
+                  <a:pt x="313718" y="4365729"/>
+                </a:cubicBezTo>
+                <a:cubicBezTo>
+                  <a:pt x="290458" y="4243177"/>
+                  <a:pt x="325347" y="4181900"/>
+                  <a:pt x="418386" y="4214341"/>
+                </a:cubicBezTo>
+                <a:cubicBezTo>
+                  <a:pt x="505609" y="4246781"/>
+                  <a:pt x="514332" y="4199922"/>
+                  <a:pt x="491072" y="4131438"/>
+                </a:cubicBezTo>
+                <a:cubicBezTo>
+                  <a:pt x="456183" y="4030512"/>
+                  <a:pt x="493979" y="3951214"/>
+                  <a:pt x="520147" y="3864706"/>
+                </a:cubicBezTo>
+                <a:cubicBezTo>
+                  <a:pt x="560851" y="3734945"/>
+                  <a:pt x="543407" y="3670064"/>
+                  <a:pt x="459090" y="3572743"/>
+                </a:cubicBezTo>
+                <a:cubicBezTo>
+                  <a:pt x="409664" y="3518676"/>
+                  <a:pt x="360236" y="3471818"/>
+                  <a:pt x="290458" y="3424959"/>
+                </a:cubicBezTo>
+                <a:cubicBezTo>
+                  <a:pt x="450368" y="3399728"/>
+                  <a:pt x="284643" y="3313221"/>
+                  <a:pt x="339884" y="3259153"/>
+                </a:cubicBezTo>
+                <a:cubicBezTo>
+                  <a:pt x="453275" y="3237527"/>
+                  <a:pt x="543407" y="3410542"/>
+                  <a:pt x="697501" y="3360078"/>
+                </a:cubicBezTo>
+                <a:cubicBezTo>
+                  <a:pt x="511425" y="3212294"/>
+                  <a:pt x="302087" y="3165436"/>
+                  <a:pt x="165437" y="2967190"/>
+                </a:cubicBezTo>
+                <a:cubicBezTo>
+                  <a:pt x="197419" y="2923937"/>
+                  <a:pt x="229401" y="2967190"/>
+                  <a:pt x="255568" y="2949167"/>
+                </a:cubicBezTo>
+                <a:cubicBezTo>
+                  <a:pt x="255568" y="2938354"/>
+                  <a:pt x="560851" y="3006840"/>
+                  <a:pt x="578296" y="2725691"/>
+                </a:cubicBezTo>
+                <a:cubicBezTo>
+                  <a:pt x="584111" y="2725691"/>
+                  <a:pt x="589926" y="2725691"/>
+                  <a:pt x="595740" y="2714876"/>
+                </a:cubicBezTo>
+                <a:cubicBezTo>
+                  <a:pt x="627722" y="2675228"/>
+                  <a:pt x="598648" y="2581510"/>
+                  <a:pt x="650982" y="2574301"/>
+                </a:cubicBezTo>
+                <a:cubicBezTo>
+                  <a:pt x="709132" y="2567092"/>
+                  <a:pt x="764373" y="2534653"/>
+                  <a:pt x="825429" y="2552674"/>
+                </a:cubicBezTo>
+                <a:cubicBezTo>
+                  <a:pt x="871949" y="2567092"/>
+                  <a:pt x="921375" y="2585115"/>
+                  <a:pt x="970802" y="2585115"/>
+                </a:cubicBezTo>
+                <a:cubicBezTo>
+                  <a:pt x="1023136" y="2585115"/>
+                  <a:pt x="1095822" y="2707668"/>
+                  <a:pt x="1127805" y="2545465"/>
+                </a:cubicBezTo>
+                <a:cubicBezTo>
+                  <a:pt x="1127805" y="2538257"/>
+                  <a:pt x="1217936" y="2556280"/>
+                  <a:pt x="1267362" y="2563488"/>
+                </a:cubicBezTo>
+                <a:cubicBezTo>
+                  <a:pt x="1308067" y="2570698"/>
+                  <a:pt x="1357494" y="2603137"/>
+                  <a:pt x="1386568" y="2538257"/>
+                </a:cubicBezTo>
+                <a:cubicBezTo>
+                  <a:pt x="1401105" y="2498607"/>
+                  <a:pt x="1331326" y="2426518"/>
+                  <a:pt x="1270270" y="2419309"/>
+                </a:cubicBezTo>
+                <a:cubicBezTo>
+                  <a:pt x="1215029" y="2412101"/>
+                  <a:pt x="1159787" y="2404892"/>
+                  <a:pt x="1107453" y="2419309"/>
+                </a:cubicBezTo>
+                <a:cubicBezTo>
+                  <a:pt x="1043489" y="2437331"/>
+                  <a:pt x="1008599" y="2408495"/>
+                  <a:pt x="991154" y="2343615"/>
+                </a:cubicBezTo>
+                <a:cubicBezTo>
+                  <a:pt x="970802" y="2275131"/>
+                  <a:pt x="933005" y="2239085"/>
+                  <a:pt x="880671" y="2206645"/>
+                </a:cubicBezTo>
+                <a:cubicBezTo>
+                  <a:pt x="752743" y="2127346"/>
+                  <a:pt x="630630" y="2033629"/>
+                  <a:pt x="491072" y="1986771"/>
+                </a:cubicBezTo>
+                <a:cubicBezTo>
+                  <a:pt x="464905" y="1979562"/>
+                  <a:pt x="432923" y="1965145"/>
+                  <a:pt x="421293" y="1903868"/>
+                </a:cubicBezTo>
+                <a:cubicBezTo>
+                  <a:pt x="799262" y="1997584"/>
+                  <a:pt x="1142342" y="2239085"/>
+                  <a:pt x="1531941" y="2224667"/>
+                </a:cubicBezTo>
+                <a:cubicBezTo>
+                  <a:pt x="1427272" y="2148974"/>
+                  <a:pt x="1302252" y="2145369"/>
+                  <a:pt x="1188861" y="2091301"/>
+                </a:cubicBezTo>
+                <a:cubicBezTo>
+                  <a:pt x="1270270" y="2051652"/>
+                  <a:pt x="1345864" y="2094906"/>
+                  <a:pt x="1421458" y="2116532"/>
+                </a:cubicBezTo>
+                <a:cubicBezTo>
+                  <a:pt x="1485422" y="2134554"/>
+                  <a:pt x="1543571" y="2138160"/>
+                  <a:pt x="1549386" y="2026420"/>
+                </a:cubicBezTo>
+                <a:cubicBezTo>
+                  <a:pt x="1549386" y="2015607"/>
+                  <a:pt x="1549386" y="2008398"/>
+                  <a:pt x="1549386" y="1997584"/>
+                </a:cubicBezTo>
+                <a:cubicBezTo>
+                  <a:pt x="1526126" y="1950727"/>
+                  <a:pt x="1494144" y="1929099"/>
+                  <a:pt x="1453440" y="1914682"/>
+                </a:cubicBezTo>
+                <a:cubicBezTo>
+                  <a:pt x="1430180" y="1907473"/>
+                  <a:pt x="1398198" y="1893056"/>
+                  <a:pt x="1398198" y="1860614"/>
+                </a:cubicBezTo>
+                <a:cubicBezTo>
+                  <a:pt x="1401105" y="1738063"/>
+                  <a:pt x="1322604" y="1702018"/>
+                  <a:pt x="1247011" y="1665972"/>
+                </a:cubicBezTo>
+                <a:cubicBezTo>
+                  <a:pt x="1287715" y="1604696"/>
+                  <a:pt x="1322604" y="1647950"/>
+                  <a:pt x="1354586" y="1644345"/>
+                </a:cubicBezTo>
+                <a:cubicBezTo>
+                  <a:pt x="1374939" y="1640741"/>
+                  <a:pt x="1395290" y="1637138"/>
+                  <a:pt x="1395290" y="1604696"/>
+                </a:cubicBezTo>
+                <a:cubicBezTo>
+                  <a:pt x="1395290" y="1579465"/>
+                  <a:pt x="1386568" y="1547025"/>
+                  <a:pt x="1366216" y="1547025"/>
+                </a:cubicBezTo>
+                <a:cubicBezTo>
+                  <a:pt x="1238288" y="1543420"/>
+                  <a:pt x="1165601" y="1370405"/>
+                  <a:pt x="1031858" y="1370405"/>
+                </a:cubicBezTo>
+                <a:cubicBezTo>
+                  <a:pt x="950450" y="1370405"/>
+                  <a:pt x="1072563" y="1273083"/>
+                  <a:pt x="1005692" y="1233435"/>
+                </a:cubicBezTo>
+                <a:cubicBezTo>
+                  <a:pt x="991154" y="1222621"/>
+                  <a:pt x="1046396" y="1208203"/>
+                  <a:pt x="1069655" y="1211808"/>
+                </a:cubicBezTo>
+                <a:cubicBezTo>
+                  <a:pt x="1092915" y="1215412"/>
+                  <a:pt x="1113268" y="1240644"/>
+                  <a:pt x="1142342" y="1222621"/>
+                </a:cubicBezTo>
+                <a:cubicBezTo>
+                  <a:pt x="1156879" y="1157741"/>
+                  <a:pt x="1119082" y="1132510"/>
+                  <a:pt x="1084193" y="1114487"/>
+                </a:cubicBezTo>
+                <a:cubicBezTo>
+                  <a:pt x="1008599" y="1071234"/>
+                  <a:pt x="933005" y="1020771"/>
+                  <a:pt x="848689" y="1006353"/>
+                </a:cubicBezTo>
+                <a:cubicBezTo>
+                  <a:pt x="819615" y="1002748"/>
+                  <a:pt x="802169" y="984726"/>
+                  <a:pt x="805077" y="948681"/>
+                </a:cubicBezTo>
+                <a:cubicBezTo>
+                  <a:pt x="810892" y="901822"/>
+                  <a:pt x="839967" y="916240"/>
+                  <a:pt x="863226" y="919844"/>
+                </a:cubicBezTo>
+                <a:cubicBezTo>
+                  <a:pt x="877764" y="923450"/>
+                  <a:pt x="892301" y="934263"/>
+                  <a:pt x="906838" y="909031"/>
+                </a:cubicBezTo>
+                <a:cubicBezTo>
+                  <a:pt x="566666" y="653113"/>
+                  <a:pt x="386404" y="667532"/>
+                  <a:pt x="5527" y="458471"/>
+                </a:cubicBezTo>
+                <a:cubicBezTo>
+                  <a:pt x="89843" y="418822"/>
+                  <a:pt x="150900" y="447658"/>
+                  <a:pt x="209049" y="454867"/>
+                </a:cubicBezTo>
+                <a:cubicBezTo>
+                  <a:pt x="354422" y="472890"/>
+                  <a:pt x="264290" y="505329"/>
+                  <a:pt x="409664" y="526956"/>
+                </a:cubicBezTo>
+                <a:cubicBezTo>
+                  <a:pt x="479443" y="537770"/>
+                  <a:pt x="543407" y="573815"/>
+                  <a:pt x="621908" y="516143"/>
+                </a:cubicBezTo>
+                <a:cubicBezTo>
+                  <a:pt x="674242" y="476494"/>
+                  <a:pt x="758558" y="519747"/>
+                  <a:pt x="822522" y="552188"/>
+                </a:cubicBezTo>
+                <a:cubicBezTo>
+                  <a:pt x="874856" y="581024"/>
+                  <a:pt x="927190" y="588232"/>
+                  <a:pt x="996969" y="552188"/>
+                </a:cubicBezTo>
+                <a:cubicBezTo>
+                  <a:pt x="933005" y="530562"/>
+                  <a:pt x="883579" y="512539"/>
+                  <a:pt x="834151" y="498120"/>
+                </a:cubicBezTo>
+                <a:cubicBezTo>
+                  <a:pt x="793447" y="487307"/>
+                  <a:pt x="770187" y="462076"/>
+                  <a:pt x="773095" y="408008"/>
+                </a:cubicBezTo>
+                <a:cubicBezTo>
+                  <a:pt x="773095" y="379172"/>
+                  <a:pt x="764373" y="339523"/>
+                  <a:pt x="793447" y="325106"/>
+                </a:cubicBezTo>
+                <a:cubicBezTo>
+                  <a:pt x="816707" y="310688"/>
+                  <a:pt x="848689" y="325106"/>
+                  <a:pt x="860319" y="350336"/>
+                </a:cubicBezTo>
+                <a:cubicBezTo>
+                  <a:pt x="874856" y="397195"/>
+                  <a:pt x="889393" y="440449"/>
+                  <a:pt x="938820" y="444054"/>
+                </a:cubicBezTo>
+                <a:cubicBezTo>
+                  <a:pt x="1005692" y="451262"/>
+                  <a:pt x="967894" y="422426"/>
+                  <a:pt x="956265" y="386381"/>
+                </a:cubicBezTo>
+                <a:cubicBezTo>
+                  <a:pt x="944635" y="346733"/>
+                  <a:pt x="979525" y="335919"/>
+                  <a:pt x="1002784" y="343127"/>
+                </a:cubicBezTo>
+                <a:cubicBezTo>
+                  <a:pt x="1090008" y="375569"/>
+                  <a:pt x="1180139" y="317897"/>
+                  <a:pt x="1270270" y="364755"/>
+                </a:cubicBezTo>
+                <a:cubicBezTo>
+                  <a:pt x="1247011" y="249411"/>
+                  <a:pt x="1197583" y="198949"/>
+                  <a:pt x="1092915" y="180926"/>
+                </a:cubicBezTo>
+                <a:cubicBezTo>
+                  <a:pt x="1055118" y="177322"/>
+                  <a:pt x="1014414" y="184530"/>
+                  <a:pt x="979525" y="152090"/>
+                </a:cubicBezTo>
+                <a:cubicBezTo>
+                  <a:pt x="959172" y="134068"/>
+                  <a:pt x="938820" y="112441"/>
+                  <a:pt x="953358" y="76396"/>
+                </a:cubicBezTo>
+                <a:cubicBezTo>
+                  <a:pt x="962080" y="51165"/>
+                  <a:pt x="985339" y="51165"/>
+                  <a:pt x="1005692" y="58373"/>
+                </a:cubicBezTo>
+                <a:cubicBezTo>
+                  <a:pt x="1090008" y="98023"/>
+                  <a:pt x="1180139" y="108837"/>
+                  <a:pt x="1267362" y="123254"/>
+                </a:cubicBezTo>
+                <a:cubicBezTo>
+                  <a:pt x="1281900" y="126859"/>
+                  <a:pt x="1296437" y="134068"/>
+                  <a:pt x="1310975" y="98023"/>
+                </a:cubicBezTo>
+                <a:cubicBezTo>
+                  <a:pt x="1260095" y="81803"/>
+                  <a:pt x="1209941" y="62879"/>
+                  <a:pt x="1159787" y="43505"/>
+                </a:cubicBezTo>
+                <a:close/>
+              </a:path>
+            </a:pathLst>
+          </a:custGeom>
+        </p:spPr>
+      </p:pic>
     </p:spTree>
     <p:extLst>
       <p:ext uri="{BB962C8B-B14F-4D97-AF65-F5344CB8AC3E}">
@@ -4199,7 +4774,7 @@
           <p:cNvPr id="2" name="Title 1">
             <a:extLst>
               <a:ext uri="{FF2B5EF4-FFF2-40B4-BE49-F238E27FC236}">
-                <a16:creationId xmlns:a16="http://schemas.microsoft.com/office/drawing/2014/main" id="{786F84C9-0AC2-4939-827B-31D9FDE80328}"/>
+                <a16:creationId xmlns:a16="http://schemas.microsoft.com/office/drawing/2014/main" id="{C15E2ECF-2076-05AC-3450-7A7384482117}"/>
               </a:ext>
             </a:extLst>
           </p:cNvPr>
@@ -4217,7 +4792,7 @@
           <a:p>
             <a:r>
               <a:rPr lang="en-US" dirty="0"/>
-              <a:t>Cons Revisited</a:t>
+              <a:t>Advice about Garbage Collection Homework</a:t>
             </a:r>
           </a:p>
         </p:txBody>
@@ -4227,7 +4802,7 @@
           <p:cNvPr id="3" name="Content Placeholder 2">
             <a:extLst>
               <a:ext uri="{FF2B5EF4-FFF2-40B4-BE49-F238E27FC236}">
-                <a16:creationId xmlns:a16="http://schemas.microsoft.com/office/drawing/2014/main" id="{7214FF21-4420-4BF5-BD16-EC3E2D1EB321}"/>
+                <a16:creationId xmlns:a16="http://schemas.microsoft.com/office/drawing/2014/main" id="{EAE292A1-FFF4-BE32-C629-B5305067D39A}"/>
               </a:ext>
             </a:extLst>
           </p:cNvPr>
@@ -4243,291 +4818,43 @@
           <a:bodyPr/>
           <a:lstStyle/>
           <a:p>
-            <a:pPr marL="0" indent="0">
-              <a:buNone/>
-            </a:pPr>
             <a:r>
               <a:rPr lang="en-US" dirty="0"/>
-              <a:t>Memory is fragmented</a:t>
-            </a:r>
-          </a:p>
-          <a:p>
+              <a:t>This is a challenging assignment – partly because we needed a representation of memory that is </a:t>
+            </a:r>
+            <a:r>
+              <a:rPr lang="en-US" dirty="0" err="1"/>
+              <a:t>kinda</a:t>
+            </a:r>
             <a:r>
               <a:rPr lang="en-US" dirty="0"/>
-              <a:t>We can use a “compacting” GC to copy objects as we traverse the tree, basically moving used memory into one contiguous block</a:t>
-            </a:r>
-          </a:p>
-          <a:p>
-            <a:pPr marL="0" indent="0">
-              <a:buNone/>
-            </a:pPr>
+              <a:t> tricky</a:t>
+            </a:r>
+          </a:p>
+          <a:p>
             <a:r>
               <a:rPr lang="en-US" dirty="0"/>
-              <a:t>Basically have to visit entire memory space – slow</a:t>
+              <a:t>You can work individually or in pairs</a:t>
             </a:r>
           </a:p>
           <a:p>
             <a:r>
               <a:rPr lang="en-US" dirty="0"/>
-              <a:t>We can use “generational GC” to usually limit our search of memory to newly created objects which are more likely to be short lived</a:t>
-            </a:r>
-          </a:p>
-          <a:p>
-            <a:pPr marL="0" indent="0">
-              <a:buNone/>
-            </a:pPr>
+              <a:t>It has 2 parts – the first part is about reachability, and the algorithm for that is not so hard.  We’ll talk about the second part tomorrow.</a:t>
+            </a:r>
+          </a:p>
+          <a:p>
             <a:r>
               <a:rPr lang="en-US" dirty="0"/>
-              <a:t>Program is paused while this is happening</a:t>
-            </a:r>
-          </a:p>
-          <a:p>
-            <a:r>
-              <a:rPr lang="en-US" dirty="0"/>
-              <a:t>There are concurrent GC that can run in a separate thread, meaning the main thread does not need to be paused</a:t>
-            </a:r>
-          </a:p>
-          <a:p>
-            <a:pPr marL="0" indent="0">
-              <a:buNone/>
-            </a:pPr>
-            <a:endParaRPr lang="en-US" dirty="0"/>
+              <a:t>It is OK if you focus on more of a “while loop” kind of solution with use of set!</a:t>
+            </a:r>
           </a:p>
         </p:txBody>
       </p:sp>
     </p:spTree>
     <p:extLst>
       <p:ext uri="{BB962C8B-B14F-4D97-AF65-F5344CB8AC3E}">
-        <p14:creationId xmlns:p14="http://schemas.microsoft.com/office/powerpoint/2010/main" val="3342512716"/>
-      </p:ext>
-    </p:extLst>
-  </p:cSld>
-  <p:clrMapOvr>
-    <a:masterClrMapping/>
-  </p:clrMapOvr>
-</p:sld>
-</file>
-
-<file path=ppt/slides/slide8.xml><?xml version="1.0" encoding="utf-8"?>
-<p:sld xmlns:a="http://schemas.openxmlformats.org/drawingml/2006/main" xmlns:r="http://schemas.openxmlformats.org/officeDocument/2006/relationships" xmlns:p="http://schemas.openxmlformats.org/presentationml/2006/main">
-  <p:cSld>
-    <p:spTree>
-      <p:nvGrpSpPr>
-        <p:cNvPr id="1" name=""/>
-        <p:cNvGrpSpPr/>
-        <p:nvPr/>
-      </p:nvGrpSpPr>
-      <p:grpSpPr>
-        <a:xfrm>
-          <a:off x="0" y="0"/>
-          <a:ext cx="0" cy="0"/>
-          <a:chOff x="0" y="0"/>
-          <a:chExt cx="0" cy="0"/>
-        </a:xfrm>
-      </p:grpSpPr>
-      <p:sp>
-        <p:nvSpPr>
-          <p:cNvPr id="2" name="Title 1">
-            <a:extLst>
-              <a:ext uri="{FF2B5EF4-FFF2-40B4-BE49-F238E27FC236}">
-                <a16:creationId xmlns:a16="http://schemas.microsoft.com/office/drawing/2014/main" id="{F447DE1D-8366-4D81-9058-D755CE340082}"/>
-              </a:ext>
-            </a:extLst>
-          </p:cNvPr>
-          <p:cNvSpPr>
-            <a:spLocks noGrp="1"/>
-          </p:cNvSpPr>
-          <p:nvPr>
-            <p:ph type="title"/>
-          </p:nvPr>
-        </p:nvSpPr>
-        <p:spPr/>
-        <p:txBody>
-          <a:bodyPr/>
-          <a:lstStyle/>
-          <a:p>
-            <a:r>
-              <a:rPr lang="en-US" dirty="0"/>
-              <a:t>What to remember about garbage collection</a:t>
-            </a:r>
-          </a:p>
-        </p:txBody>
-      </p:sp>
-      <p:sp>
-        <p:nvSpPr>
-          <p:cNvPr id="3" name="Content Placeholder 2">
-            <a:extLst>
-              <a:ext uri="{FF2B5EF4-FFF2-40B4-BE49-F238E27FC236}">
-                <a16:creationId xmlns:a16="http://schemas.microsoft.com/office/drawing/2014/main" id="{5FB9434A-826B-446B-A284-05715855C6E5}"/>
-              </a:ext>
-            </a:extLst>
-          </p:cNvPr>
-          <p:cNvSpPr>
-            <a:spLocks noGrp="1"/>
-          </p:cNvSpPr>
-          <p:nvPr>
-            <p:ph idx="1"/>
-          </p:nvPr>
-        </p:nvSpPr>
-        <p:spPr/>
-        <p:txBody>
-          <a:bodyPr/>
-          <a:lstStyle/>
-          <a:p>
-            <a:pPr marL="0" indent="0">
-              <a:buNone/>
-            </a:pPr>
-            <a:r>
-              <a:rPr lang="en-US" dirty="0"/>
-              <a:t>Cons:</a:t>
-            </a:r>
-          </a:p>
-          <a:p>
-            <a:pPr marL="514350" indent="-514350">
-              <a:buFont typeface="+mj-lt"/>
-              <a:buAutoNum type="arabicPeriod"/>
-            </a:pPr>
-            <a:r>
-              <a:rPr lang="en-US" dirty="0"/>
-              <a:t>Reliable garbage collection generally requires some pretty   expensive operations.  We can amortize or use heuristics to improve  the cost but not eliminate it.</a:t>
-            </a:r>
-          </a:p>
-          <a:p>
-            <a:pPr marL="514350" indent="-514350">
-              <a:buFont typeface="+mj-lt"/>
-              <a:buAutoNum type="arabicPeriod"/>
-            </a:pPr>
-            <a:r>
-              <a:rPr lang="en-US" dirty="0"/>
-              <a:t>Modern GC algorithms are complex so GC can produce pauses at   unexpected times in your code</a:t>
-            </a:r>
-          </a:p>
-          <a:p>
-            <a:pPr marL="0" indent="0">
-              <a:buNone/>
-            </a:pPr>
-            <a:r>
-              <a:rPr lang="en-US" dirty="0"/>
-              <a:t>Pros:</a:t>
-            </a:r>
-          </a:p>
-          <a:p>
-            <a:pPr marL="514350" indent="-514350">
-              <a:buFont typeface="+mj-lt"/>
-              <a:buAutoNum type="arabicPeriod"/>
-            </a:pPr>
-            <a:r>
-              <a:rPr lang="en-US" dirty="0"/>
-              <a:t>Reliably eliminates a whole class of bugs and super doesn't matter   for small/medium programs</a:t>
-            </a:r>
-          </a:p>
-        </p:txBody>
-      </p:sp>
-    </p:spTree>
-    <p:extLst>
-      <p:ext uri="{BB962C8B-B14F-4D97-AF65-F5344CB8AC3E}">
-        <p14:creationId xmlns:p14="http://schemas.microsoft.com/office/powerpoint/2010/main" val="2745690674"/>
-      </p:ext>
-    </p:extLst>
-  </p:cSld>
-  <p:clrMapOvr>
-    <a:masterClrMapping/>
-  </p:clrMapOvr>
-</p:sld>
-</file>
-
-<file path=ppt/slides/slide9.xml><?xml version="1.0" encoding="utf-8"?>
-<p:sld xmlns:a="http://schemas.openxmlformats.org/drawingml/2006/main" xmlns:r="http://schemas.openxmlformats.org/officeDocument/2006/relationships" xmlns:p="http://schemas.openxmlformats.org/presentationml/2006/main">
-  <p:cSld>
-    <p:spTree>
-      <p:nvGrpSpPr>
-        <p:cNvPr id="1" name=""/>
-        <p:cNvGrpSpPr/>
-        <p:nvPr/>
-      </p:nvGrpSpPr>
-      <p:grpSpPr>
-        <a:xfrm>
-          <a:off x="0" y="0"/>
-          <a:ext cx="0" cy="0"/>
-          <a:chOff x="0" y="0"/>
-          <a:chExt cx="0" cy="0"/>
-        </a:xfrm>
-      </p:grpSpPr>
-      <p:sp>
-        <p:nvSpPr>
-          <p:cNvPr id="2" name="Title 1">
-            <a:extLst>
-              <a:ext uri="{FF2B5EF4-FFF2-40B4-BE49-F238E27FC236}">
-                <a16:creationId xmlns:a16="http://schemas.microsoft.com/office/drawing/2014/main" id="{B2924D1F-11F2-48D7-B02E-780F3EB854BB}"/>
-              </a:ext>
-            </a:extLst>
-          </p:cNvPr>
-          <p:cNvSpPr>
-            <a:spLocks noGrp="1"/>
-          </p:cNvSpPr>
-          <p:nvPr>
-            <p:ph type="title"/>
-          </p:nvPr>
-        </p:nvSpPr>
-        <p:spPr/>
-        <p:txBody>
-          <a:bodyPr/>
-          <a:lstStyle/>
-          <a:p>
-            <a:r>
-              <a:rPr lang="en-US" dirty="0"/>
-              <a:t>Good advice</a:t>
-            </a:r>
-          </a:p>
-        </p:txBody>
-      </p:sp>
-      <p:sp>
-        <p:nvSpPr>
-          <p:cNvPr id="3" name="Content Placeholder 2">
-            <a:extLst>
-              <a:ext uri="{FF2B5EF4-FFF2-40B4-BE49-F238E27FC236}">
-                <a16:creationId xmlns:a16="http://schemas.microsoft.com/office/drawing/2014/main" id="{98FB9367-3118-4BEC-A922-9761BC895D7F}"/>
-              </a:ext>
-            </a:extLst>
-          </p:cNvPr>
-          <p:cNvSpPr>
-            <a:spLocks noGrp="1"/>
-          </p:cNvSpPr>
-          <p:nvPr>
-            <p:ph idx="1"/>
-          </p:nvPr>
-        </p:nvSpPr>
-        <p:spPr/>
-        <p:txBody>
-          <a:bodyPr/>
-          <a:lstStyle/>
-          <a:p>
-            <a:r>
-              <a:rPr lang="en-US" dirty="0"/>
-              <a:t>A language like scheme can make it so that you don’t have to care about memory…but it comes at a cost</a:t>
-            </a:r>
-          </a:p>
-          <a:p>
-            <a:r>
-              <a:rPr lang="en-US" dirty="0"/>
-              <a:t>Most parts of most programs don’t use a ton of memory, so it’s not a big deal if there are inefficiencies</a:t>
-            </a:r>
-          </a:p>
-          <a:p>
-            <a:r>
-              <a:rPr lang="en-US" dirty="0"/>
-              <a:t>BUT as programs get large, memory usage is almost always a consideration.  Any time you’re dealing with a aspect of the code that is using heavy memory, you need to consider how it will be cleaned carefully.  This can be harder in a language where you don’t have direct control of memory.</a:t>
-            </a:r>
-          </a:p>
-          <a:p>
-            <a:endParaRPr lang="en-US" dirty="0"/>
-          </a:p>
-        </p:txBody>
-      </p:sp>
-    </p:spTree>
-    <p:extLst>
-      <p:ext uri="{BB962C8B-B14F-4D97-AF65-F5344CB8AC3E}">
-        <p14:creationId xmlns:p14="http://schemas.microsoft.com/office/powerpoint/2010/main" val="4020060907"/>
+        <p14:creationId xmlns:p14="http://schemas.microsoft.com/office/powerpoint/2010/main" val="1571497730"/>
       </p:ext>
     </p:extLst>
   </p:cSld>

</xml_diff>